<commit_message>
Added additional documents for our final project.
Some of the documents were renamed, and added Pattern Description doc,
and Project Description doc, also updated DungeonSystemUML.
</commit_message>
<xml_diff>
--- a/Presentation/Final Team Report.pptx
+++ b/Presentation/Final Team Report.pptx
@@ -114,7 +114,7 @@
   </p:defaultTextStyle>
   <p:extLst>
     <p:ext uri="{EFAFB233-063F-42B5-8137-9DF3F51BA10A}">
-      <p15:sldGuideLst xmlns:p15="http://schemas.microsoft.com/office/powerpoint/2012/main" xmlns=""/>
+      <p15:sldGuideLst xmlns="" xmlns:p15="http://schemas.microsoft.com/office/powerpoint/2012/main"/>
     </p:ext>
   </p:extLst>
 </p:presentation>
@@ -5999,8 +5999,36 @@
           <a:p>
             <a:r>
               <a:rPr lang="en-US" dirty="0" smtClean="0"/>
-              <a:t>Manages the grid where the players and enemies interact.</a:t>
-            </a:r>
+              <a:t>Manages the grid where the players and enemies interact</a:t>
+            </a:r>
+            <a:r>
+              <a:rPr lang="en-US" dirty="0" smtClean="0"/>
+              <a:t>.</a:t>
+            </a:r>
+          </a:p>
+          <a:p>
+            <a:r>
+              <a:rPr lang="en-US" dirty="0" smtClean="0"/>
+              <a:t>Knows where the player is at in the grid.</a:t>
+            </a:r>
+            <a:endParaRPr lang="en-US" dirty="0" smtClean="0"/>
+          </a:p>
+          <a:p>
+            <a:r>
+              <a:rPr lang="en-US" dirty="0" smtClean="0"/>
+              <a:t>The grid can be static or dynamic.</a:t>
+            </a:r>
+          </a:p>
+          <a:p>
+            <a:r>
+              <a:rPr lang="en-US" dirty="0" smtClean="0"/>
+              <a:t>Does not allow the players to move outside of the grid or throug</a:t>
+            </a:r>
+            <a:r>
+              <a:rPr lang="en-US" dirty="0" smtClean="0"/>
+              <a:t>h a wall.</a:t>
+            </a:r>
+            <a:endParaRPr lang="en-US" dirty="0" smtClean="0"/>
           </a:p>
           <a:p>
             <a:r>
@@ -6017,7 +6045,23 @@
           <a:p>
             <a:r>
               <a:rPr lang="en-US" dirty="0" smtClean="0"/>
-              <a:t>Tiles can be walls as well.</a:t>
+              <a:t>Tiles can </a:t>
+            </a:r>
+            <a:r>
+              <a:rPr lang="en-US" dirty="0" smtClean="0"/>
+              <a:t>also be a </a:t>
+            </a:r>
+            <a:r>
+              <a:rPr lang="en-US" dirty="0" err="1" smtClean="0"/>
+              <a:t>freespace</a:t>
+            </a:r>
+            <a:r>
+              <a:rPr lang="en-US" dirty="0" smtClean="0"/>
+              <a:t>, or a wall as </a:t>
+            </a:r>
+            <a:r>
+              <a:rPr lang="en-US" dirty="0" smtClean="0"/>
+              <a:t>well.</a:t>
             </a:r>
             <a:endParaRPr lang="en-US" dirty="0"/>
           </a:p>
@@ -6608,12 +6652,12 @@
               <a:t>This would </a:t>
             </a:r>
             <a:r>
-              <a:rPr lang="en-US" dirty="0" err="1" smtClean="0"/>
-              <a:t>requre</a:t>
-            </a:r>
-            <a:r>
               <a:rPr lang="en-US" dirty="0" smtClean="0"/>
-              <a:t> the whole system to be redesigned to work with the GUI, so we just stayed with the console input.</a:t>
+              <a:t>require </a:t>
+            </a:r>
+            <a:r>
+              <a:rPr lang="en-US" dirty="0" smtClean="0"/>
+              <a:t>the whole system to be redesigned to work with the GUI, so we just stayed with the console input.</a:t>
             </a:r>
           </a:p>
           <a:p>
@@ -6999,7 +7043,7 @@
   <a:extraClrSchemeLst/>
   <a:extLst>
     <a:ext uri="{05A4C25C-085E-4340-85A3-A5531E510DB2}">
-      <thm15:themeFamily xmlns:thm15="http://schemas.microsoft.com/office/thememl/2012/main" xmlns="" name="Vapor Trail" id="{4FDF2955-7D9C-493C-B9F9-C205151B46CD}" vid="{8F31A783-2159-4870-BC29-2BA7D038EA44}"/>
+      <thm15:themeFamily xmlns="" xmlns:thm15="http://schemas.microsoft.com/office/thememl/2012/main" name="Vapor Trail" id="{4FDF2955-7D9C-493C-B9F9-C205151B46CD}" vid="{8F31A783-2159-4870-BC29-2BA7D038EA44}"/>
     </a:ext>
   </a:extLst>
 </a:theme>

</xml_diff>